<commit_message>
updated XL and ppt
</commit_message>
<xml_diff>
--- a/Spark Funds Presentation.pptx
+++ b/Spark Funds Presentation.pptx
@@ -209,7 +209,7 @@
           <a:p>
             <a:fld id="{2E309023-AF2B-4043-B228-F191CADC9BB1}" type="datetimeFigureOut">
               <a:rPr lang="en-IN" smtClean="0"/>
-              <a:t>06-04-2017</a:t>
+              <a:t>07/04/19</a:t>
             </a:fld>
             <a:endParaRPr lang="en-IN"/>
           </a:p>
@@ -608,7 +608,7 @@
           <a:p>
             <a:fld id="{70C018FE-C8D6-4A9C-A702-41F1E0C1C452}" type="datetimeFigureOut">
               <a:rPr lang="en-IN" smtClean="0"/>
-              <a:t>06-04-2017</a:t>
+              <a:t>07/04/19</a:t>
             </a:fld>
             <a:endParaRPr lang="en-IN"/>
           </a:p>
@@ -778,7 +778,7 @@
           <a:p>
             <a:fld id="{70C018FE-C8D6-4A9C-A702-41F1E0C1C452}" type="datetimeFigureOut">
               <a:rPr lang="en-IN" smtClean="0"/>
-              <a:t>06-04-2017</a:t>
+              <a:t>07/04/19</a:t>
             </a:fld>
             <a:endParaRPr lang="en-IN"/>
           </a:p>
@@ -958,7 +958,7 @@
           <a:p>
             <a:fld id="{70C018FE-C8D6-4A9C-A702-41F1E0C1C452}" type="datetimeFigureOut">
               <a:rPr lang="en-IN" smtClean="0"/>
-              <a:t>06-04-2017</a:t>
+              <a:t>07/04/19</a:t>
             </a:fld>
             <a:endParaRPr lang="en-IN"/>
           </a:p>
@@ -1390,7 +1390,7 @@
           <a:p>
             <a:fld id="{70C018FE-C8D6-4A9C-A702-41F1E0C1C452}" type="datetimeFigureOut">
               <a:rPr lang="en-IN" smtClean="0"/>
-              <a:t>06-04-2017</a:t>
+              <a:t>07/04/19</a:t>
             </a:fld>
             <a:endParaRPr lang="en-IN"/>
           </a:p>
@@ -1622,7 +1622,7 @@
           <a:p>
             <a:fld id="{70C018FE-C8D6-4A9C-A702-41F1E0C1C452}" type="datetimeFigureOut">
               <a:rPr lang="en-IN" smtClean="0"/>
-              <a:t>06-04-2017</a:t>
+              <a:t>07/04/19</a:t>
             </a:fld>
             <a:endParaRPr lang="en-IN"/>
           </a:p>
@@ -1989,7 +1989,7 @@
           <a:p>
             <a:fld id="{70C018FE-C8D6-4A9C-A702-41F1E0C1C452}" type="datetimeFigureOut">
               <a:rPr lang="en-IN" smtClean="0"/>
-              <a:t>06-04-2017</a:t>
+              <a:t>07/04/19</a:t>
             </a:fld>
             <a:endParaRPr lang="en-IN"/>
           </a:p>
@@ -2107,7 +2107,7 @@
           <a:p>
             <a:fld id="{70C018FE-C8D6-4A9C-A702-41F1E0C1C452}" type="datetimeFigureOut">
               <a:rPr lang="en-IN" smtClean="0"/>
-              <a:t>06-04-2017</a:t>
+              <a:t>07/04/19</a:t>
             </a:fld>
             <a:endParaRPr lang="en-IN"/>
           </a:p>
@@ -2202,7 +2202,7 @@
           <a:p>
             <a:fld id="{70C018FE-C8D6-4A9C-A702-41F1E0C1C452}" type="datetimeFigureOut">
               <a:rPr lang="en-IN" smtClean="0"/>
-              <a:t>06-04-2017</a:t>
+              <a:t>07/04/19</a:t>
             </a:fld>
             <a:endParaRPr lang="en-IN"/>
           </a:p>
@@ -2478,7 +2478,7 @@
           <a:p>
             <a:fld id="{70C018FE-C8D6-4A9C-A702-41F1E0C1C452}" type="datetimeFigureOut">
               <a:rPr lang="en-IN" smtClean="0"/>
-              <a:t>06-04-2017</a:t>
+              <a:t>07/04/19</a:t>
             </a:fld>
             <a:endParaRPr lang="en-IN"/>
           </a:p>
@@ -2735,7 +2735,7 @@
           <a:p>
             <a:fld id="{70C018FE-C8D6-4A9C-A702-41F1E0C1C452}" type="datetimeFigureOut">
               <a:rPr lang="en-IN" smtClean="0"/>
-              <a:t>06-04-2017</a:t>
+              <a:t>07/04/19</a:t>
             </a:fld>
             <a:endParaRPr lang="en-IN"/>
           </a:p>
@@ -2946,7 +2946,7 @@
           <a:p>
             <a:fld id="{70C018FE-C8D6-4A9C-A702-41F1E0C1C452}" type="datetimeFigureOut">
               <a:rPr lang="en-IN" smtClean="0"/>
-              <a:t>06-04-2017</a:t>
+              <a:t>07/04/19</a:t>
             </a:fld>
             <a:endParaRPr lang="en-IN" dirty="0"/>
           </a:p>
@@ -3493,7 +3493,7 @@
         </p:spPr>
         <p:txBody>
           <a:bodyPr>
-            <a:normAutofit fontScale="92500" lnSpcReduction="20000"/>
+            <a:normAutofit/>
           </a:bodyPr>
           <a:lstStyle/>
           <a:p>
@@ -3514,45 +3514,8 @@
             </a:pPr>
             <a:r>
               <a:rPr lang="en-IN" sz="1800" dirty="0"/>
-              <a:t> Member name</a:t>
-            </a:r>
-          </a:p>
-          <a:p>
-            <a:pPr marL="457200" indent="-457200" algn="l">
-              <a:buFont typeface="+mj-lt"/>
-              <a:buAutoNum type="arabicPeriod"/>
-            </a:pPr>
-            <a:r>
-              <a:rPr lang="en-IN" sz="1800" dirty="0"/>
-              <a:t> Member name</a:t>
-            </a:r>
-          </a:p>
-          <a:p>
-            <a:pPr marL="457200" indent="-457200" algn="l">
-              <a:buFont typeface="+mj-lt"/>
-              <a:buAutoNum type="arabicPeriod"/>
-            </a:pPr>
-            <a:r>
-              <a:rPr lang="en-IN" sz="1800" dirty="0"/>
-              <a:t> Member name</a:t>
-            </a:r>
-          </a:p>
-          <a:p>
-            <a:pPr marL="457200" indent="-457200" algn="l">
-              <a:buFont typeface="+mj-lt"/>
-              <a:buAutoNum type="arabicPeriod"/>
-            </a:pPr>
-            <a:r>
-              <a:rPr lang="en-IN" sz="1800" dirty="0"/>
-              <a:t> Member name</a:t>
-            </a:r>
-          </a:p>
-          <a:p>
-            <a:pPr marL="457200" indent="-457200" algn="l">
-              <a:buFont typeface="+mj-lt"/>
-              <a:buAutoNum type="arabicPeriod"/>
-            </a:pPr>
-            <a:endParaRPr lang="en-IN" sz="1800" dirty="0"/>
+              <a:t> Hemant Satam</a:t>
+            </a:r>
           </a:p>
         </p:txBody>
       </p:sp>
@@ -3688,10 +3651,115 @@
           </a:bodyPr>
           <a:lstStyle/>
           <a:p>
-            <a:pPr marL="0" indent="0">
-              <a:buNone/>
+            <a:pPr>
+              <a:buFont typeface="Wingdings" pitchFamily="2" charset="2"/>
+              <a:buChar char="v"/>
             </a:pPr>
-            <a:endParaRPr lang="en-IN" sz="1400" dirty="0"/>
+            <a:r>
+              <a:rPr lang="en-IN" sz="1600" dirty="0"/>
+              <a:t>Overview</a:t>
+            </a:r>
+          </a:p>
+          <a:p>
+            <a:pPr lvl="1">
+              <a:buFont typeface="Wingdings" pitchFamily="2" charset="2"/>
+              <a:buChar char="v"/>
+            </a:pPr>
+            <a:r>
+              <a:rPr lang="en-IN" sz="1600" dirty="0"/>
+              <a:t>Spark Funds is an asset management company</a:t>
+            </a:r>
+          </a:p>
+          <a:p>
+            <a:pPr lvl="1">
+              <a:buFont typeface="Wingdings" pitchFamily="2" charset="2"/>
+              <a:buChar char="v"/>
+            </a:pPr>
+            <a:r>
+              <a:rPr lang="en-IN" sz="1600" dirty="0"/>
+              <a:t>Spark Funds want to make investments in a few companies</a:t>
+            </a:r>
+          </a:p>
+          <a:p>
+            <a:pPr lvl="1">
+              <a:buFont typeface="Wingdings" pitchFamily="2" charset="2"/>
+              <a:buChar char="v"/>
+            </a:pPr>
+            <a:r>
+              <a:rPr lang="en-IN" sz="1600" dirty="0"/>
+              <a:t>CEO of Spark funds wants to understand the global trends in investments in order to take effective decisions</a:t>
+            </a:r>
+          </a:p>
+          <a:p>
+            <a:pPr>
+              <a:buFont typeface="Wingdings" pitchFamily="2" charset="2"/>
+              <a:buChar char="v"/>
+            </a:pPr>
+            <a:endParaRPr lang="en-IN" sz="1600" dirty="0"/>
+          </a:p>
+          <a:p>
+            <a:pPr>
+              <a:buFont typeface="Wingdings" pitchFamily="2" charset="2"/>
+              <a:buChar char="v"/>
+            </a:pPr>
+            <a:r>
+              <a:rPr lang="en-IN" sz="1600" dirty="0"/>
+              <a:t>Constraints</a:t>
+            </a:r>
+          </a:p>
+          <a:p>
+            <a:pPr lvl="1">
+              <a:buFont typeface="Wingdings" pitchFamily="2" charset="2"/>
+              <a:buChar char="v"/>
+            </a:pPr>
+            <a:r>
+              <a:rPr lang="en-IN" sz="1600" dirty="0"/>
+              <a:t>Spark funds to invest between 5 to 15 million USD per round of investment</a:t>
+            </a:r>
+          </a:p>
+          <a:p>
+            <a:pPr lvl="1">
+              <a:buFont typeface="Wingdings" pitchFamily="2" charset="2"/>
+              <a:buChar char="v"/>
+            </a:pPr>
+            <a:r>
+              <a:rPr lang="en-IN" sz="1600" dirty="0"/>
+              <a:t>Spark funds want to invest only in English-speaking countries for ease of communications with companies it invests in</a:t>
+            </a:r>
+          </a:p>
+          <a:p>
+            <a:pPr>
+              <a:buFont typeface="Wingdings" pitchFamily="2" charset="2"/>
+              <a:buChar char="v"/>
+            </a:pPr>
+            <a:endParaRPr lang="en-IN" sz="1600" dirty="0"/>
+          </a:p>
+          <a:p>
+            <a:pPr>
+              <a:buFont typeface="Wingdings" pitchFamily="2" charset="2"/>
+              <a:buChar char="v"/>
+            </a:pPr>
+            <a:r>
+              <a:rPr lang="en-IN" sz="1600" dirty="0"/>
+              <a:t>Strategy</a:t>
+            </a:r>
+          </a:p>
+          <a:p>
+            <a:pPr lvl="1">
+              <a:buFont typeface="Wingdings" pitchFamily="2" charset="2"/>
+              <a:buChar char="v"/>
+            </a:pPr>
+            <a:r>
+              <a:rPr lang="en-IN" sz="1600" dirty="0"/>
+              <a:t>Spark Funds wants to invest in where most other investors are investing</a:t>
+            </a:r>
+          </a:p>
+          <a:p>
+            <a:pPr>
+              <a:buFont typeface="Wingdings" pitchFamily="2" charset="2"/>
+              <a:buChar char="v"/>
+            </a:pPr>
+            <a:endParaRPr lang="en-IN" sz="1600" dirty="0"/>
           </a:p>
         </p:txBody>
       </p:sp>
@@ -3758,33 +3826,6 @@
       </p:grpSpPr>
       <p:sp>
         <p:nvSpPr>
-          <p:cNvPr id="3" name="Content Placeholder 2"/>
-          <p:cNvSpPr>
-            <a:spLocks noGrp="1"/>
-          </p:cNvSpPr>
-          <p:nvPr>
-            <p:ph idx="1"/>
-          </p:nvPr>
-        </p:nvSpPr>
-        <p:spPr/>
-        <p:txBody>
-          <a:bodyPr>
-            <a:normAutofit/>
-          </a:bodyPr>
-          <a:lstStyle/>
-          <a:p>
-            <a:pPr marL="0" indent="0">
-              <a:buNone/>
-            </a:pPr>
-            <a:r>
-              <a:rPr lang="en-IN" sz="1800" dirty="0"/>
-              <a:t>Use flow chart</a:t>
-            </a:r>
-          </a:p>
-        </p:txBody>
-      </p:sp>
-      <p:sp>
-        <p:nvSpPr>
           <p:cNvPr id="5" name="Title 1"/>
           <p:cNvSpPr>
             <a:spLocks noGrp="1"/>
@@ -3814,6 +3855,692 @@
           </a:p>
         </p:txBody>
       </p:sp>
+      <p:grpSp>
+        <p:nvGrpSpPr>
+          <p:cNvPr id="30" name="Group 29">
+            <a:extLst>
+              <a:ext uri="{FF2B5EF4-FFF2-40B4-BE49-F238E27FC236}">
+                <a16:creationId xmlns:a16="http://schemas.microsoft.com/office/drawing/2014/main" id="{C16611A0-6204-C34A-9A69-BF7996ED5774}"/>
+              </a:ext>
+            </a:extLst>
+          </p:cNvPr>
+          <p:cNvGrpSpPr/>
+          <p:nvPr/>
+        </p:nvGrpSpPr>
+        <p:grpSpPr>
+          <a:xfrm>
+            <a:off x="1370429" y="1851532"/>
+            <a:ext cx="10549054" cy="3838202"/>
+            <a:chOff x="746175" y="1728439"/>
+            <a:chExt cx="10549054" cy="3838202"/>
+          </a:xfrm>
+        </p:grpSpPr>
+        <p:sp>
+          <p:nvSpPr>
+            <p:cNvPr id="7" name="Rounded Rectangle 6">
+              <a:extLst>
+                <a:ext uri="{FF2B5EF4-FFF2-40B4-BE49-F238E27FC236}">
+                  <a16:creationId xmlns:a16="http://schemas.microsoft.com/office/drawing/2014/main" id="{1B145370-F5BC-1D4C-AAD2-8AA004A7AA26}"/>
+                </a:ext>
+              </a:extLst>
+            </p:cNvPr>
+            <p:cNvSpPr/>
+            <p:nvPr/>
+          </p:nvSpPr>
+          <p:spPr>
+            <a:xfrm>
+              <a:off x="746175" y="1728439"/>
+              <a:ext cx="1806498" cy="947854"/>
+            </a:xfrm>
+            <a:prstGeom prst="roundRect">
+              <a:avLst/>
+            </a:prstGeom>
+          </p:spPr>
+          <p:style>
+            <a:lnRef idx="2">
+              <a:schemeClr val="accent1">
+                <a:shade val="50000"/>
+              </a:schemeClr>
+            </a:lnRef>
+            <a:fillRef idx="1">
+              <a:schemeClr val="accent1"/>
+            </a:fillRef>
+            <a:effectRef idx="0">
+              <a:schemeClr val="accent1"/>
+            </a:effectRef>
+            <a:fontRef idx="minor">
+              <a:schemeClr val="lt1"/>
+            </a:fontRef>
+          </p:style>
+          <p:txBody>
+            <a:bodyPr rtlCol="0" anchor="ctr"/>
+            <a:lstStyle/>
+            <a:p>
+              <a:pPr algn="ctr"/>
+              <a:r>
+                <a:rPr lang="en-US" dirty="0"/>
+                <a:t>Investment type Analysis</a:t>
+              </a:r>
+            </a:p>
+          </p:txBody>
+        </p:sp>
+        <p:sp>
+          <p:nvSpPr>
+            <p:cNvPr id="8" name="Rounded Rectangle 7">
+              <a:extLst>
+                <a:ext uri="{FF2B5EF4-FFF2-40B4-BE49-F238E27FC236}">
+                  <a16:creationId xmlns:a16="http://schemas.microsoft.com/office/drawing/2014/main" id="{AFC86EFF-CF78-B543-8494-042EA31C0D55}"/>
+                </a:ext>
+              </a:extLst>
+            </p:cNvPr>
+            <p:cNvSpPr/>
+            <p:nvPr/>
+          </p:nvSpPr>
+          <p:spPr>
+            <a:xfrm>
+              <a:off x="746175" y="4618787"/>
+              <a:ext cx="1806498" cy="947854"/>
+            </a:xfrm>
+            <a:prstGeom prst="roundRect">
+              <a:avLst/>
+            </a:prstGeom>
+          </p:spPr>
+          <p:style>
+            <a:lnRef idx="2">
+              <a:schemeClr val="accent1">
+                <a:shade val="50000"/>
+              </a:schemeClr>
+            </a:lnRef>
+            <a:fillRef idx="1">
+              <a:schemeClr val="accent1"/>
+            </a:fillRef>
+            <a:effectRef idx="0">
+              <a:schemeClr val="accent1"/>
+            </a:effectRef>
+            <a:fontRef idx="minor">
+              <a:schemeClr val="lt1"/>
+            </a:fontRef>
+          </p:style>
+          <p:txBody>
+            <a:bodyPr rtlCol="0" anchor="ctr"/>
+            <a:lstStyle/>
+            <a:p>
+              <a:pPr algn="ctr"/>
+              <a:r>
+                <a:rPr lang="en-US" dirty="0"/>
+                <a:t>Sector Analysis</a:t>
+              </a:r>
+            </a:p>
+          </p:txBody>
+        </p:sp>
+        <p:sp>
+          <p:nvSpPr>
+            <p:cNvPr id="9" name="Rounded Rectangle 8">
+              <a:extLst>
+                <a:ext uri="{FF2B5EF4-FFF2-40B4-BE49-F238E27FC236}">
+                  <a16:creationId xmlns:a16="http://schemas.microsoft.com/office/drawing/2014/main" id="{B7A57FB3-C8F6-B040-8D4E-3AD78C416AA7}"/>
+                </a:ext>
+              </a:extLst>
+            </p:cNvPr>
+            <p:cNvSpPr/>
+            <p:nvPr/>
+          </p:nvSpPr>
+          <p:spPr>
+            <a:xfrm>
+              <a:off x="746175" y="3173613"/>
+              <a:ext cx="1806498" cy="947854"/>
+            </a:xfrm>
+            <a:prstGeom prst="roundRect">
+              <a:avLst/>
+            </a:prstGeom>
+          </p:spPr>
+          <p:style>
+            <a:lnRef idx="2">
+              <a:schemeClr val="accent1">
+                <a:shade val="50000"/>
+              </a:schemeClr>
+            </a:lnRef>
+            <a:fillRef idx="1">
+              <a:schemeClr val="accent1"/>
+            </a:fillRef>
+            <a:effectRef idx="0">
+              <a:schemeClr val="accent1"/>
+            </a:effectRef>
+            <a:fontRef idx="minor">
+              <a:schemeClr val="lt1"/>
+            </a:fontRef>
+          </p:style>
+          <p:txBody>
+            <a:bodyPr rtlCol="0" anchor="ctr"/>
+            <a:lstStyle/>
+            <a:p>
+              <a:pPr algn="ctr"/>
+              <a:r>
+                <a:rPr lang="en-US" dirty="0"/>
+                <a:t>Country Analysis</a:t>
+              </a:r>
+            </a:p>
+          </p:txBody>
+        </p:sp>
+        <p:sp>
+          <p:nvSpPr>
+            <p:cNvPr id="11" name="Rectangle 10">
+              <a:extLst>
+                <a:ext uri="{FF2B5EF4-FFF2-40B4-BE49-F238E27FC236}">
+                  <a16:creationId xmlns:a16="http://schemas.microsoft.com/office/drawing/2014/main" id="{0B8009B9-2492-1943-8D3D-F3596941012A}"/>
+                </a:ext>
+              </a:extLst>
+            </p:cNvPr>
+            <p:cNvSpPr/>
+            <p:nvPr/>
+          </p:nvSpPr>
+          <p:spPr>
+            <a:xfrm>
+              <a:off x="2705073" y="2048964"/>
+              <a:ext cx="7418542" cy="273579"/>
+            </a:xfrm>
+            <a:prstGeom prst="rect">
+              <a:avLst/>
+            </a:prstGeom>
+          </p:spPr>
+          <p:style>
+            <a:lnRef idx="0">
+              <a:schemeClr val="dk1">
+                <a:alpha val="0"/>
+                <a:hueOff val="0"/>
+                <a:satOff val="0"/>
+                <a:lumOff val="0"/>
+                <a:alphaOff val="0"/>
+              </a:schemeClr>
+            </a:lnRef>
+            <a:fillRef idx="0">
+              <a:schemeClr val="lt1">
+                <a:alpha val="0"/>
+                <a:hueOff val="0"/>
+                <a:satOff val="0"/>
+                <a:lumOff val="0"/>
+                <a:alphaOff val="0"/>
+              </a:schemeClr>
+            </a:fillRef>
+            <a:effectRef idx="0">
+              <a:schemeClr val="lt1">
+                <a:alpha val="0"/>
+                <a:hueOff val="0"/>
+                <a:satOff val="0"/>
+                <a:lumOff val="0"/>
+                <a:alphaOff val="0"/>
+              </a:schemeClr>
+            </a:effectRef>
+            <a:fontRef idx="minor">
+              <a:schemeClr val="tx1">
+                <a:hueOff val="0"/>
+                <a:satOff val="0"/>
+                <a:lumOff val="0"/>
+                <a:alphaOff val="0"/>
+              </a:schemeClr>
+            </a:fontRef>
+          </p:style>
+        </p:sp>
+        <p:sp>
+          <p:nvSpPr>
+            <p:cNvPr id="17" name="Rectangle 16">
+              <a:extLst>
+                <a:ext uri="{FF2B5EF4-FFF2-40B4-BE49-F238E27FC236}">
+                  <a16:creationId xmlns:a16="http://schemas.microsoft.com/office/drawing/2014/main" id="{CE5CE019-349D-F34F-9E1F-B9073647396D}"/>
+                </a:ext>
+              </a:extLst>
+            </p:cNvPr>
+            <p:cNvSpPr/>
+            <p:nvPr/>
+          </p:nvSpPr>
+          <p:spPr>
+            <a:xfrm>
+              <a:off x="5404003" y="4727575"/>
+              <a:ext cx="5155559" cy="690190"/>
+            </a:xfrm>
+            <a:prstGeom prst="rect">
+              <a:avLst/>
+            </a:prstGeom>
+          </p:spPr>
+          <p:style>
+            <a:lnRef idx="0">
+              <a:schemeClr val="dk1">
+                <a:alpha val="0"/>
+                <a:hueOff val="0"/>
+                <a:satOff val="0"/>
+                <a:lumOff val="0"/>
+                <a:alphaOff val="0"/>
+              </a:schemeClr>
+            </a:lnRef>
+            <a:fillRef idx="0">
+              <a:schemeClr val="lt1">
+                <a:alpha val="0"/>
+                <a:hueOff val="0"/>
+                <a:satOff val="0"/>
+                <a:lumOff val="0"/>
+                <a:alphaOff val="0"/>
+              </a:schemeClr>
+            </a:fillRef>
+            <a:effectRef idx="0">
+              <a:schemeClr val="lt1">
+                <a:alpha val="0"/>
+                <a:hueOff val="0"/>
+                <a:satOff val="0"/>
+                <a:lumOff val="0"/>
+                <a:alphaOff val="0"/>
+              </a:schemeClr>
+            </a:effectRef>
+            <a:fontRef idx="minor">
+              <a:schemeClr val="tx1">
+                <a:hueOff val="0"/>
+                <a:satOff val="0"/>
+                <a:lumOff val="0"/>
+                <a:alphaOff val="0"/>
+              </a:schemeClr>
+            </a:fontRef>
+          </p:style>
+        </p:sp>
+        <p:sp>
+          <p:nvSpPr>
+            <p:cNvPr id="19" name="TextBox 18">
+              <a:extLst>
+                <a:ext uri="{FF2B5EF4-FFF2-40B4-BE49-F238E27FC236}">
+                  <a16:creationId xmlns:a16="http://schemas.microsoft.com/office/drawing/2014/main" id="{8C0248F3-1687-D847-AC07-AB677B2E1833}"/>
+                </a:ext>
+              </a:extLst>
+            </p:cNvPr>
+            <p:cNvSpPr txBox="1"/>
+            <p:nvPr/>
+          </p:nvSpPr>
+          <p:spPr>
+            <a:xfrm>
+              <a:off x="2705073" y="4747619"/>
+              <a:ext cx="6966466" cy="690190"/>
+            </a:xfrm>
+            <a:prstGeom prst="rect">
+              <a:avLst/>
+            </a:prstGeom>
+          </p:spPr>
+          <p:style>
+            <a:lnRef idx="0">
+              <a:scrgbClr r="0" g="0" b="0"/>
+            </a:lnRef>
+            <a:fillRef idx="0">
+              <a:scrgbClr r="0" g="0" b="0"/>
+            </a:fillRef>
+            <a:effectRef idx="0">
+              <a:scrgbClr r="0" g="0" b="0"/>
+            </a:effectRef>
+            <a:fontRef idx="minor">
+              <a:schemeClr val="tx1">
+                <a:hueOff val="0"/>
+                <a:satOff val="0"/>
+                <a:lumOff val="0"/>
+                <a:alphaOff val="0"/>
+              </a:schemeClr>
+            </a:fontRef>
+          </p:style>
+          <p:txBody>
+            <a:bodyPr spcFirstLastPara="0" vert="horz" wrap="square" lIns="60960" tIns="60960" rIns="60960" bIns="60960" numCol="1" spcCol="1270" anchor="ctr" anchorCtr="0">
+              <a:noAutofit/>
+            </a:bodyPr>
+            <a:lstStyle/>
+            <a:p>
+              <a:pPr marL="171450" lvl="1" indent="-171450" algn="l" defTabSz="711200">
+                <a:lnSpc>
+                  <a:spcPct val="90000"/>
+                </a:lnSpc>
+                <a:spcBef>
+                  <a:spcPct val="0"/>
+                </a:spcBef>
+                <a:spcAft>
+                  <a:spcPct val="15000"/>
+                </a:spcAft>
+                <a:buChar char="•"/>
+              </a:pPr>
+              <a:r>
+                <a:rPr lang="en-US" sz="1600" kern="1200" dirty="0"/>
+                <a:t>Understand the distribution of investments across eight sectors</a:t>
+              </a:r>
+            </a:p>
+            <a:p>
+              <a:pPr marL="171450" lvl="1" indent="-171450" algn="l" defTabSz="711200">
+                <a:lnSpc>
+                  <a:spcPct val="90000"/>
+                </a:lnSpc>
+                <a:spcBef>
+                  <a:spcPct val="0"/>
+                </a:spcBef>
+                <a:spcAft>
+                  <a:spcPct val="15000"/>
+                </a:spcAft>
+                <a:buChar char="•"/>
+              </a:pPr>
+              <a:r>
+                <a:rPr lang="en-US" sz="1600" kern="1200" dirty="0"/>
+                <a:t>Suggest top 3 sectors in which 3 identified countries have maximum investment</a:t>
+              </a:r>
+            </a:p>
+          </p:txBody>
+        </p:sp>
+        <p:sp>
+          <p:nvSpPr>
+            <p:cNvPr id="24" name="Rectangle 23">
+              <a:extLst>
+                <a:ext uri="{FF2B5EF4-FFF2-40B4-BE49-F238E27FC236}">
+                  <a16:creationId xmlns:a16="http://schemas.microsoft.com/office/drawing/2014/main" id="{34E35AD9-EA0A-CF49-91F1-C759225E4817}"/>
+                </a:ext>
+              </a:extLst>
+            </p:cNvPr>
+            <p:cNvSpPr/>
+            <p:nvPr/>
+          </p:nvSpPr>
+          <p:spPr>
+            <a:xfrm>
+              <a:off x="4511571" y="3510751"/>
+              <a:ext cx="6783658" cy="273579"/>
+            </a:xfrm>
+            <a:prstGeom prst="rect">
+              <a:avLst/>
+            </a:prstGeom>
+          </p:spPr>
+          <p:style>
+            <a:lnRef idx="0">
+              <a:schemeClr val="dk1">
+                <a:alpha val="0"/>
+                <a:hueOff val="0"/>
+                <a:satOff val="0"/>
+                <a:lumOff val="0"/>
+                <a:alphaOff val="0"/>
+              </a:schemeClr>
+            </a:lnRef>
+            <a:fillRef idx="0">
+              <a:schemeClr val="lt1">
+                <a:alpha val="0"/>
+                <a:hueOff val="0"/>
+                <a:satOff val="0"/>
+                <a:lumOff val="0"/>
+                <a:alphaOff val="0"/>
+              </a:schemeClr>
+            </a:fillRef>
+            <a:effectRef idx="0">
+              <a:schemeClr val="lt1">
+                <a:alpha val="0"/>
+                <a:hueOff val="0"/>
+                <a:satOff val="0"/>
+                <a:lumOff val="0"/>
+                <a:alphaOff val="0"/>
+              </a:schemeClr>
+            </a:effectRef>
+            <a:fontRef idx="minor">
+              <a:schemeClr val="tx1">
+                <a:hueOff val="0"/>
+                <a:satOff val="0"/>
+                <a:lumOff val="0"/>
+                <a:alphaOff val="0"/>
+              </a:schemeClr>
+            </a:fontRef>
+          </p:style>
+        </p:sp>
+        <p:sp>
+          <p:nvSpPr>
+            <p:cNvPr id="26" name="TextBox 25">
+              <a:extLst>
+                <a:ext uri="{FF2B5EF4-FFF2-40B4-BE49-F238E27FC236}">
+                  <a16:creationId xmlns:a16="http://schemas.microsoft.com/office/drawing/2014/main" id="{61E30AD7-C8CA-CC46-9FB6-91BB35513F9E}"/>
+                </a:ext>
+              </a:extLst>
+            </p:cNvPr>
+            <p:cNvSpPr txBox="1"/>
+            <p:nvPr/>
+          </p:nvSpPr>
+          <p:spPr>
+            <a:xfrm>
+              <a:off x="2705073" y="3376017"/>
+              <a:ext cx="6783658" cy="543046"/>
+            </a:xfrm>
+            <a:prstGeom prst="rect">
+              <a:avLst/>
+            </a:prstGeom>
+          </p:spPr>
+          <p:style>
+            <a:lnRef idx="0">
+              <a:scrgbClr r="0" g="0" b="0"/>
+            </a:lnRef>
+            <a:fillRef idx="0">
+              <a:scrgbClr r="0" g="0" b="0"/>
+            </a:fillRef>
+            <a:effectRef idx="0">
+              <a:scrgbClr r="0" g="0" b="0"/>
+            </a:effectRef>
+            <a:fontRef idx="minor">
+              <a:schemeClr val="tx1">
+                <a:hueOff val="0"/>
+                <a:satOff val="0"/>
+                <a:lumOff val="0"/>
+                <a:alphaOff val="0"/>
+              </a:schemeClr>
+            </a:fontRef>
+          </p:style>
+          <p:txBody>
+            <a:bodyPr spcFirstLastPara="0" vert="horz" wrap="square" lIns="60960" tIns="60960" rIns="60960" bIns="60960" numCol="1" spcCol="1270" anchor="ctr" anchorCtr="0">
+              <a:noAutofit/>
+            </a:bodyPr>
+            <a:lstStyle/>
+            <a:p>
+              <a:pPr marL="171450" lvl="1" indent="-171450" algn="l" defTabSz="711200">
+                <a:lnSpc>
+                  <a:spcPct val="90000"/>
+                </a:lnSpc>
+                <a:spcBef>
+                  <a:spcPct val="0"/>
+                </a:spcBef>
+                <a:spcAft>
+                  <a:spcPct val="15000"/>
+                </a:spcAft>
+                <a:buChar char="•"/>
+              </a:pPr>
+              <a:r>
+                <a:rPr lang="en-US" sz="1600" kern="1200" dirty="0"/>
+                <a:t>Identify countries which have been most heavily invested in the past</a:t>
+              </a:r>
+            </a:p>
+            <a:p>
+              <a:pPr marL="171450" lvl="1" indent="-171450" algn="l" defTabSz="711200">
+                <a:lnSpc>
+                  <a:spcPct val="90000"/>
+                </a:lnSpc>
+                <a:spcBef>
+                  <a:spcPct val="0"/>
+                </a:spcBef>
+                <a:spcAft>
+                  <a:spcPct val="15000"/>
+                </a:spcAft>
+                <a:buChar char="•"/>
+              </a:pPr>
+              <a:r>
+                <a:rPr lang="en-US" sz="1600" kern="1200" dirty="0"/>
+                <a:t>Countries identified has to be English Speaking countries (manually identified)</a:t>
+              </a:r>
+            </a:p>
+          </p:txBody>
+        </p:sp>
+        <p:sp>
+          <p:nvSpPr>
+            <p:cNvPr id="27" name="TextBox 26">
+              <a:extLst>
+                <a:ext uri="{FF2B5EF4-FFF2-40B4-BE49-F238E27FC236}">
+                  <a16:creationId xmlns:a16="http://schemas.microsoft.com/office/drawing/2014/main" id="{5F733E23-752B-5C43-891C-4E974A1278C8}"/>
+                </a:ext>
+              </a:extLst>
+            </p:cNvPr>
+            <p:cNvSpPr txBox="1"/>
+            <p:nvPr/>
+          </p:nvSpPr>
+          <p:spPr>
+            <a:xfrm>
+              <a:off x="2705073" y="1972763"/>
+              <a:ext cx="7418542" cy="425979"/>
+            </a:xfrm>
+            <a:prstGeom prst="rect">
+              <a:avLst/>
+            </a:prstGeom>
+          </p:spPr>
+          <p:style>
+            <a:lnRef idx="0">
+              <a:scrgbClr r="0" g="0" b="0"/>
+            </a:lnRef>
+            <a:fillRef idx="0">
+              <a:scrgbClr r="0" g="0" b="0"/>
+            </a:fillRef>
+            <a:effectRef idx="0">
+              <a:scrgbClr r="0" g="0" b="0"/>
+            </a:effectRef>
+            <a:fontRef idx="minor">
+              <a:schemeClr val="tx1">
+                <a:hueOff val="0"/>
+                <a:satOff val="0"/>
+                <a:lumOff val="0"/>
+                <a:alphaOff val="0"/>
+              </a:schemeClr>
+            </a:fontRef>
+          </p:style>
+          <p:txBody>
+            <a:bodyPr spcFirstLastPara="0" vert="horz" wrap="square" lIns="60960" tIns="60960" rIns="60960" bIns="60960" numCol="1" spcCol="1270" anchor="ctr" anchorCtr="0">
+              <a:noAutofit/>
+            </a:bodyPr>
+            <a:lstStyle/>
+            <a:p>
+              <a:pPr marL="171450" lvl="1" indent="-171450" algn="l" defTabSz="711200">
+                <a:lnSpc>
+                  <a:spcPct val="90000"/>
+                </a:lnSpc>
+                <a:spcBef>
+                  <a:spcPct val="0"/>
+                </a:spcBef>
+                <a:spcAft>
+                  <a:spcPct val="15000"/>
+                </a:spcAft>
+                <a:buChar char="•"/>
+              </a:pPr>
+              <a:r>
+                <a:rPr lang="en-US" sz="1600" kern="1200" dirty="0"/>
+                <a:t>Compare typical investment amounts in a venture, seed, angel and private equity</a:t>
+              </a:r>
+            </a:p>
+            <a:p>
+              <a:pPr marL="171450" lvl="1" indent="-171450" algn="l" defTabSz="711200">
+                <a:lnSpc>
+                  <a:spcPct val="90000"/>
+                </a:lnSpc>
+                <a:spcBef>
+                  <a:spcPct val="0"/>
+                </a:spcBef>
+                <a:spcAft>
+                  <a:spcPct val="15000"/>
+                </a:spcAft>
+                <a:buChar char="•"/>
+              </a:pPr>
+              <a:r>
+                <a:rPr lang="en-US" sz="1600" kern="1200" dirty="0"/>
+                <a:t>Enable Spark fund to choose the investment type that is best suited for their strategy</a:t>
+              </a:r>
+            </a:p>
+          </p:txBody>
+        </p:sp>
+        <p:sp>
+          <p:nvSpPr>
+            <p:cNvPr id="28" name="Down Arrow 27">
+              <a:extLst>
+                <a:ext uri="{FF2B5EF4-FFF2-40B4-BE49-F238E27FC236}">
+                  <a16:creationId xmlns:a16="http://schemas.microsoft.com/office/drawing/2014/main" id="{3D438598-3A9D-794B-912B-169C62EA40F9}"/>
+                </a:ext>
+              </a:extLst>
+            </p:cNvPr>
+            <p:cNvSpPr/>
+            <p:nvPr/>
+          </p:nvSpPr>
+          <p:spPr>
+            <a:xfrm>
+              <a:off x="1529862" y="2760785"/>
+              <a:ext cx="334107" cy="334107"/>
+            </a:xfrm>
+            <a:prstGeom prst="downArrow">
+              <a:avLst/>
+            </a:prstGeom>
+          </p:spPr>
+          <p:style>
+            <a:lnRef idx="2">
+              <a:schemeClr val="accent1">
+                <a:shade val="50000"/>
+              </a:schemeClr>
+            </a:lnRef>
+            <a:fillRef idx="1">
+              <a:schemeClr val="accent1"/>
+            </a:fillRef>
+            <a:effectRef idx="0">
+              <a:schemeClr val="accent1"/>
+            </a:effectRef>
+            <a:fontRef idx="minor">
+              <a:schemeClr val="lt1"/>
+            </a:fontRef>
+          </p:style>
+          <p:txBody>
+            <a:bodyPr rtlCol="0" anchor="ctr"/>
+            <a:lstStyle/>
+            <a:p>
+              <a:pPr algn="ctr"/>
+              <a:endParaRPr lang="en-US"/>
+            </a:p>
+          </p:txBody>
+        </p:sp>
+        <p:sp>
+          <p:nvSpPr>
+            <p:cNvPr id="29" name="Down Arrow 28">
+              <a:extLst>
+                <a:ext uri="{FF2B5EF4-FFF2-40B4-BE49-F238E27FC236}">
+                  <a16:creationId xmlns:a16="http://schemas.microsoft.com/office/drawing/2014/main" id="{13891763-896F-CD4B-8ACA-A068E01011BF}"/>
+                </a:ext>
+              </a:extLst>
+            </p:cNvPr>
+            <p:cNvSpPr/>
+            <p:nvPr/>
+          </p:nvSpPr>
+          <p:spPr>
+            <a:xfrm>
+              <a:off x="1529861" y="4200188"/>
+              <a:ext cx="334107" cy="334107"/>
+            </a:xfrm>
+            <a:prstGeom prst="downArrow">
+              <a:avLst/>
+            </a:prstGeom>
+          </p:spPr>
+          <p:style>
+            <a:lnRef idx="2">
+              <a:schemeClr val="accent1">
+                <a:shade val="50000"/>
+              </a:schemeClr>
+            </a:lnRef>
+            <a:fillRef idx="1">
+              <a:schemeClr val="accent1"/>
+            </a:fillRef>
+            <a:effectRef idx="0">
+              <a:schemeClr val="accent1"/>
+            </a:effectRef>
+            <a:fontRef idx="minor">
+              <a:schemeClr val="lt1"/>
+            </a:fontRef>
+          </p:style>
+          <p:txBody>
+            <a:bodyPr rtlCol="0" anchor="ctr"/>
+            <a:lstStyle/>
+            <a:p>
+              <a:pPr algn="ctr"/>
+              <a:endParaRPr lang="en-US"/>
+            </a:p>
+          </p:txBody>
+        </p:sp>
+      </p:grpSp>
     </p:spTree>
     <p:extLst>
       <p:ext uri="{BB962C8B-B14F-4D97-AF65-F5344CB8AC3E}">
@@ -3887,10 +4614,36 @@
           </a:bodyPr>
           <a:lstStyle/>
           <a:p>
-            <a:pPr marL="0" indent="0">
-              <a:buNone/>
+            <a:pPr>
+              <a:buFont typeface="Wingdings" pitchFamily="2" charset="2"/>
+              <a:buChar char="v"/>
             </a:pPr>
-            <a:endParaRPr lang="en-IN" sz="1400" dirty="0"/>
+            <a:r>
+              <a:rPr lang="en-IN" sz="1600" dirty="0"/>
+              <a:t>Data Cleaning</a:t>
+            </a:r>
+          </a:p>
+          <a:p>
+            <a:pPr lvl="1">
+              <a:buFont typeface="Wingdings" pitchFamily="2" charset="2"/>
+              <a:buChar char="v"/>
+            </a:pPr>
+            <a:r>
+              <a:rPr lang="en-IN" sz="1600" dirty="0"/>
+              <a:t>Data available for companies and round2 contains data for [permalink] which needs cleansing prior to </a:t>
+            </a:r>
+            <a:r>
+              <a:rPr lang="en-IN" sz="1600" dirty="0" err="1"/>
+              <a:t>uage</a:t>
+            </a:r>
+            <a:endParaRPr lang="en-IN" sz="1600"/>
+          </a:p>
+          <a:p>
+            <a:pPr lvl="1">
+              <a:buFont typeface="Wingdings" pitchFamily="2" charset="2"/>
+              <a:buChar char="v"/>
+            </a:pPr>
+            <a:endParaRPr lang="en-IN" sz="1600" dirty="0"/>
           </a:p>
         </p:txBody>
       </p:sp>
@@ -4137,11 +4890,77 @@
             </a:r>
             <a:r>
               <a:rPr lang="en-IN" sz="2800" dirty="0"/>
-              <a:t>&lt;Results&gt;</a:t>
-            </a:r>
-          </a:p>
-        </p:txBody>
-      </p:sp>
+              <a:t>&lt;Results – Investment by Funding Type&gt;</a:t>
+            </a:r>
+          </a:p>
+        </p:txBody>
+      </p:sp>
+      <p:pic>
+        <p:nvPicPr>
+          <p:cNvPr id="4" name="Picture 3">
+            <a:extLst>
+              <a:ext uri="{FF2B5EF4-FFF2-40B4-BE49-F238E27FC236}">
+                <a16:creationId xmlns:a16="http://schemas.microsoft.com/office/drawing/2014/main" id="{48557C8A-7088-6443-B7E1-8A707FFB0595}"/>
+              </a:ext>
+            </a:extLst>
+          </p:cNvPr>
+          <p:cNvPicPr>
+            <a:picLocks noChangeAspect="1"/>
+          </p:cNvPicPr>
+          <p:nvPr/>
+        </p:nvPicPr>
+        <p:blipFill>
+          <a:blip r:embed="rId2">
+            <a:extLst>
+              <a:ext uri="{28A0092B-C50C-407E-A947-70E740481C1C}">
+                <a14:useLocalDpi xmlns:a14="http://schemas.microsoft.com/office/drawing/2010/main" val="0"/>
+              </a:ext>
+            </a:extLst>
+          </a:blip>
+          <a:stretch>
+            <a:fillRect/>
+          </a:stretch>
+        </p:blipFill>
+        <p:spPr>
+          <a:xfrm>
+            <a:off x="1467838" y="1761623"/>
+            <a:ext cx="9359999" cy="4680000"/>
+          </a:xfrm>
+          <a:prstGeom prst="rect">
+            <a:avLst/>
+          </a:prstGeom>
+          <a:solidFill>
+            <a:srgbClr val="FFFFFF">
+              <a:shade val="85000"/>
+            </a:srgbClr>
+          </a:solidFill>
+          <a:ln w="88900" cap="sq">
+            <a:solidFill>
+              <a:srgbClr val="FFFFFF"/>
+            </a:solidFill>
+            <a:miter lim="800000"/>
+          </a:ln>
+          <a:effectLst>
+            <a:outerShdw blurRad="55000" dist="18000" dir="5400000" algn="tl" rotWithShape="0">
+              <a:srgbClr val="000000">
+                <a:alpha val="40000"/>
+              </a:srgbClr>
+            </a:outerShdw>
+          </a:effectLst>
+          <a:scene3d>
+            <a:camera prst="orthographicFront"/>
+            <a:lightRig rig="twoPt" dir="t">
+              <a:rot lat="0" lon="0" rev="7200000"/>
+            </a:lightRig>
+          </a:scene3d>
+          <a:sp3d>
+            <a:bevelT w="25400" h="19050"/>
+            <a:contourClr>
+              <a:srgbClr val="FFFFFF"/>
+            </a:contourClr>
+          </a:sp3d>
+        </p:spPr>
+      </p:pic>
     </p:spTree>
     <p:extLst>
       <p:ext uri="{BB962C8B-B14F-4D97-AF65-F5344CB8AC3E}">
@@ -4216,7 +5035,9 @@
           </a:xfrm>
         </p:spPr>
         <p:txBody>
-          <a:bodyPr/>
+          <a:bodyPr>
+            <a:normAutofit fontScale="90000"/>
+          </a:bodyPr>
           <a:lstStyle/>
           <a:p>
             <a:r>
@@ -4225,11 +5046,77 @@
             </a:r>
             <a:r>
               <a:rPr lang="en-IN" sz="2800" dirty="0"/>
-              <a:t>&lt;Results&gt;</a:t>
-            </a:r>
-          </a:p>
-        </p:txBody>
-      </p:sp>
+              <a:t>&lt;Results – Investment by Top 9 Countries (by count and amount)&gt;</a:t>
+            </a:r>
+          </a:p>
+        </p:txBody>
+      </p:sp>
+      <p:pic>
+        <p:nvPicPr>
+          <p:cNvPr id="4" name="Picture 3">
+            <a:extLst>
+              <a:ext uri="{FF2B5EF4-FFF2-40B4-BE49-F238E27FC236}">
+                <a16:creationId xmlns:a16="http://schemas.microsoft.com/office/drawing/2014/main" id="{586A27F8-241C-A741-8951-9275B188F4CC}"/>
+              </a:ext>
+            </a:extLst>
+          </p:cNvPr>
+          <p:cNvPicPr>
+            <a:picLocks noChangeAspect="1"/>
+          </p:cNvPicPr>
+          <p:nvPr/>
+        </p:nvPicPr>
+        <p:blipFill>
+          <a:blip r:embed="rId2">
+            <a:extLst>
+              <a:ext uri="{28A0092B-C50C-407E-A947-70E740481C1C}">
+                <a14:useLocalDpi xmlns:a14="http://schemas.microsoft.com/office/drawing/2010/main" val="0"/>
+              </a:ext>
+            </a:extLst>
+          </a:blip>
+          <a:stretch>
+            <a:fillRect/>
+          </a:stretch>
+        </p:blipFill>
+        <p:spPr>
+          <a:xfrm>
+            <a:off x="1461837" y="1758673"/>
+            <a:ext cx="9360000" cy="4680000"/>
+          </a:xfrm>
+          <a:prstGeom prst="rect">
+            <a:avLst/>
+          </a:prstGeom>
+          <a:solidFill>
+            <a:srgbClr val="FFFFFF">
+              <a:shade val="85000"/>
+            </a:srgbClr>
+          </a:solidFill>
+          <a:ln w="88900" cap="sq">
+            <a:solidFill>
+              <a:srgbClr val="FFFFFF"/>
+            </a:solidFill>
+            <a:miter lim="800000"/>
+          </a:ln>
+          <a:effectLst>
+            <a:outerShdw blurRad="55000" dist="18000" dir="5400000" algn="tl" rotWithShape="0">
+              <a:srgbClr val="000000">
+                <a:alpha val="40000"/>
+              </a:srgbClr>
+            </a:outerShdw>
+          </a:effectLst>
+          <a:scene3d>
+            <a:camera prst="orthographicFront"/>
+            <a:lightRig rig="twoPt" dir="t">
+              <a:rot lat="0" lon="0" rev="7200000"/>
+            </a:lightRig>
+          </a:scene3d>
+          <a:sp3d>
+            <a:bevelT w="25400" h="19050"/>
+            <a:contourClr>
+              <a:srgbClr val="FFFFFF"/>
+            </a:contourClr>
+          </a:sp3d>
+        </p:spPr>
+      </p:pic>
     </p:spTree>
     <p:extLst>
       <p:ext uri="{BB962C8B-B14F-4D97-AF65-F5344CB8AC3E}">
@@ -4318,6 +5205,72 @@
           </a:p>
         </p:txBody>
       </p:sp>
+      <p:pic>
+        <p:nvPicPr>
+          <p:cNvPr id="4" name="Picture 3">
+            <a:extLst>
+              <a:ext uri="{FF2B5EF4-FFF2-40B4-BE49-F238E27FC236}">
+                <a16:creationId xmlns:a16="http://schemas.microsoft.com/office/drawing/2014/main" id="{08C25878-08A0-A845-A408-8ADBDFE92C9C}"/>
+              </a:ext>
+            </a:extLst>
+          </p:cNvPr>
+          <p:cNvPicPr>
+            <a:picLocks noChangeAspect="1"/>
+          </p:cNvPicPr>
+          <p:nvPr/>
+        </p:nvPicPr>
+        <p:blipFill>
+          <a:blip r:embed="rId2">
+            <a:extLst>
+              <a:ext uri="{28A0092B-C50C-407E-A947-70E740481C1C}">
+                <a14:useLocalDpi xmlns:a14="http://schemas.microsoft.com/office/drawing/2010/main" val="0"/>
+              </a:ext>
+            </a:extLst>
+          </a:blip>
+          <a:stretch>
+            <a:fillRect/>
+          </a:stretch>
+        </p:blipFill>
+        <p:spPr>
+          <a:xfrm>
+            <a:off x="1485900" y="1770648"/>
+            <a:ext cx="9360000" cy="4680000"/>
+          </a:xfrm>
+          <a:prstGeom prst="rect">
+            <a:avLst/>
+          </a:prstGeom>
+          <a:solidFill>
+            <a:srgbClr val="FFFFFF">
+              <a:shade val="85000"/>
+            </a:srgbClr>
+          </a:solidFill>
+          <a:ln w="88900" cap="sq">
+            <a:solidFill>
+              <a:srgbClr val="FFFFFF"/>
+            </a:solidFill>
+            <a:miter lim="800000"/>
+          </a:ln>
+          <a:effectLst>
+            <a:outerShdw blurRad="55000" dist="18000" dir="5400000" algn="tl" rotWithShape="0">
+              <a:srgbClr val="000000">
+                <a:alpha val="40000"/>
+              </a:srgbClr>
+            </a:outerShdw>
+          </a:effectLst>
+          <a:scene3d>
+            <a:camera prst="orthographicFront"/>
+            <a:lightRig rig="twoPt" dir="t">
+              <a:rot lat="0" lon="0" rev="7200000"/>
+            </a:lightRig>
+          </a:scene3d>
+          <a:sp3d>
+            <a:bevelT w="25400" h="19050"/>
+            <a:contourClr>
+              <a:srgbClr val="FFFFFF"/>
+            </a:contourClr>
+          </a:sp3d>
+        </p:spPr>
+      </p:pic>
     </p:spTree>
     <p:extLst>
       <p:ext uri="{BB962C8B-B14F-4D97-AF65-F5344CB8AC3E}">

</xml_diff>